<commit_message>
Atulização Crosstalk - Diego Nogueira
</commit_message>
<xml_diff>
--- a/Tipos de Ruídos.pptx
+++ b/Tipos de Ruídos.pptx
@@ -11,7 +11,9 @@
     <p:sldId id="259" r:id="rId5"/>
     <p:sldId id="261" r:id="rId6"/>
     <p:sldId id="262" r:id="rId7"/>
-    <p:sldId id="263" r:id="rId8"/>
+    <p:sldId id="264" r:id="rId8"/>
+    <p:sldId id="265" r:id="rId9"/>
+    <p:sldId id="263" r:id="rId10"/>
   </p:sldIdLst>
   <p:sldSz cx="12192000" cy="6858000"/>
   <p:notesSz cx="6858000" cy="9144000"/>
@@ -110,6 +112,11 @@
       </a:defRPr>
     </a:lvl9pPr>
   </p:defaultTextStyle>
+  <p:extLst>
+    <p:ext uri="{EFAFB233-063F-42B5-8137-9DF3F51BA10A}">
+      <p15:sldGuideLst xmlns:p15="http://schemas.microsoft.com/office/powerpoint/2012/main"/>
+    </p:ext>
+  </p:extLst>
 </p:presentation>
 </file>
 
@@ -244,7 +251,7 @@
           <a:p>
             <a:fld id="{FD832175-C0F1-4C3D-89AD-A6EE219BD78A}" type="datetimeFigureOut">
               <a:rPr lang="pt-BR" smtClean="0"/>
-              <a:t>18/04/2018</a:t>
+              <a:t>20/04/2018</a:t>
             </a:fld>
             <a:endParaRPr lang="pt-BR"/>
           </a:p>
@@ -414,7 +421,7 @@
           <a:p>
             <a:fld id="{FD832175-C0F1-4C3D-89AD-A6EE219BD78A}" type="datetimeFigureOut">
               <a:rPr lang="pt-BR" smtClean="0"/>
-              <a:t>18/04/2018</a:t>
+              <a:t>20/04/2018</a:t>
             </a:fld>
             <a:endParaRPr lang="pt-BR"/>
           </a:p>
@@ -594,7 +601,7 @@
           <a:p>
             <a:fld id="{FD832175-C0F1-4C3D-89AD-A6EE219BD78A}" type="datetimeFigureOut">
               <a:rPr lang="pt-BR" smtClean="0"/>
-              <a:t>18/04/2018</a:t>
+              <a:t>20/04/2018</a:t>
             </a:fld>
             <a:endParaRPr lang="pt-BR"/>
           </a:p>
@@ -764,7 +771,7 @@
           <a:p>
             <a:fld id="{FD832175-C0F1-4C3D-89AD-A6EE219BD78A}" type="datetimeFigureOut">
               <a:rPr lang="pt-BR" smtClean="0"/>
-              <a:t>18/04/2018</a:t>
+              <a:t>20/04/2018</a:t>
             </a:fld>
             <a:endParaRPr lang="pt-BR"/>
           </a:p>
@@ -1010,7 +1017,7 @@
           <a:p>
             <a:fld id="{FD832175-C0F1-4C3D-89AD-A6EE219BD78A}" type="datetimeFigureOut">
               <a:rPr lang="pt-BR" smtClean="0"/>
-              <a:t>18/04/2018</a:t>
+              <a:t>20/04/2018</a:t>
             </a:fld>
             <a:endParaRPr lang="pt-BR"/>
           </a:p>
@@ -1242,7 +1249,7 @@
           <a:p>
             <a:fld id="{FD832175-C0F1-4C3D-89AD-A6EE219BD78A}" type="datetimeFigureOut">
               <a:rPr lang="pt-BR" smtClean="0"/>
-              <a:t>18/04/2018</a:t>
+              <a:t>20/04/2018</a:t>
             </a:fld>
             <a:endParaRPr lang="pt-BR"/>
           </a:p>
@@ -1609,7 +1616,7 @@
           <a:p>
             <a:fld id="{FD832175-C0F1-4C3D-89AD-A6EE219BD78A}" type="datetimeFigureOut">
               <a:rPr lang="pt-BR" smtClean="0"/>
-              <a:t>18/04/2018</a:t>
+              <a:t>20/04/2018</a:t>
             </a:fld>
             <a:endParaRPr lang="pt-BR"/>
           </a:p>
@@ -1727,7 +1734,7 @@
           <a:p>
             <a:fld id="{FD832175-C0F1-4C3D-89AD-A6EE219BD78A}" type="datetimeFigureOut">
               <a:rPr lang="pt-BR" smtClean="0"/>
-              <a:t>18/04/2018</a:t>
+              <a:t>20/04/2018</a:t>
             </a:fld>
             <a:endParaRPr lang="pt-BR"/>
           </a:p>
@@ -1822,7 +1829,7 @@
           <a:p>
             <a:fld id="{FD832175-C0F1-4C3D-89AD-A6EE219BD78A}" type="datetimeFigureOut">
               <a:rPr lang="pt-BR" smtClean="0"/>
-              <a:t>18/04/2018</a:t>
+              <a:t>20/04/2018</a:t>
             </a:fld>
             <a:endParaRPr lang="pt-BR"/>
           </a:p>
@@ -2099,7 +2106,7 @@
           <a:p>
             <a:fld id="{FD832175-C0F1-4C3D-89AD-A6EE219BD78A}" type="datetimeFigureOut">
               <a:rPr lang="pt-BR" smtClean="0"/>
-              <a:t>18/04/2018</a:t>
+              <a:t>20/04/2018</a:t>
             </a:fld>
             <a:endParaRPr lang="pt-BR"/>
           </a:p>
@@ -2352,7 +2359,7 @@
           <a:p>
             <a:fld id="{FD832175-C0F1-4C3D-89AD-A6EE219BD78A}" type="datetimeFigureOut">
               <a:rPr lang="pt-BR" smtClean="0"/>
-              <a:t>18/04/2018</a:t>
+              <a:t>20/04/2018</a:t>
             </a:fld>
             <a:endParaRPr lang="pt-BR"/>
           </a:p>
@@ -2574,7 +2581,7 @@
           <a:p>
             <a:fld id="{FD832175-C0F1-4C3D-89AD-A6EE219BD78A}" type="datetimeFigureOut">
               <a:rPr lang="pt-BR" smtClean="0"/>
-              <a:t>18/04/2018</a:t>
+              <a:t>20/04/2018</a:t>
             </a:fld>
             <a:endParaRPr lang="pt-BR"/>
           </a:p>
@@ -4033,6 +4040,104 @@
           <a:bodyPr/>
           <a:lstStyle/>
           <a:p>
+            <a:r>
+              <a:rPr lang="pt-BR" sz="3200" b="1" dirty="0" err="1" smtClean="0">
+                <a:solidFill>
+                  <a:schemeClr val="bg1"/>
+                </a:solidFill>
+              </a:rPr>
+              <a:t>Crosstalk</a:t>
+            </a:r>
+            <a:r>
+              <a:rPr lang="pt-BR" sz="3200" dirty="0">
+                <a:solidFill>
+                  <a:schemeClr val="bg1"/>
+                </a:solidFill>
+              </a:rPr>
+              <a:t> ou </a:t>
+            </a:r>
+            <a:r>
+              <a:rPr lang="pt-BR" sz="3200" dirty="0" err="1">
+                <a:solidFill>
+                  <a:schemeClr val="bg1"/>
+                </a:solidFill>
+              </a:rPr>
+              <a:t>diafonia</a:t>
+            </a:r>
+            <a:r>
+              <a:rPr lang="pt-BR" sz="3200" dirty="0">
+                <a:solidFill>
+                  <a:schemeClr val="bg1"/>
+                </a:solidFill>
+              </a:rPr>
+              <a:t> é a </a:t>
+            </a:r>
+            <a:r>
+              <a:rPr lang="pt-BR" sz="3200" dirty="0" smtClean="0">
+                <a:solidFill>
+                  <a:schemeClr val="bg1"/>
+                </a:solidFill>
+              </a:rPr>
+              <a:t>interferência </a:t>
+            </a:r>
+            <a:r>
+              <a:rPr lang="pt-BR" sz="3200" dirty="0">
+                <a:solidFill>
+                  <a:schemeClr val="bg1"/>
+                </a:solidFill>
+              </a:rPr>
+              <a:t> indesejada que um canal de transmissão causa em outro. Foi observado pela primeira vez durante a </a:t>
+            </a:r>
+            <a:r>
+              <a:rPr lang="pt-BR" sz="3200" dirty="0" smtClean="0">
+                <a:solidFill>
+                  <a:schemeClr val="bg1"/>
+                </a:solidFill>
+              </a:rPr>
+              <a:t>Segunda Guerra Mundial, </a:t>
+            </a:r>
+            <a:r>
+              <a:rPr lang="pt-BR" sz="3200" dirty="0">
+                <a:solidFill>
+                  <a:schemeClr val="bg1"/>
+                </a:solidFill>
+              </a:rPr>
+              <a:t>devido à grande quantidade de transmissões que eram feitas na </a:t>
+            </a:r>
+            <a:r>
+              <a:rPr lang="pt-BR" sz="3200" dirty="0" smtClean="0">
+                <a:solidFill>
+                  <a:schemeClr val="bg1"/>
+                </a:solidFill>
+              </a:rPr>
+              <a:t>época. Essa </a:t>
+            </a:r>
+            <a:r>
+              <a:rPr lang="pt-BR" sz="3200" dirty="0">
+                <a:solidFill>
+                  <a:schemeClr val="bg1"/>
+                </a:solidFill>
+              </a:rPr>
+              <a:t>interferência é criada por um </a:t>
+            </a:r>
+            <a:r>
+              <a:rPr lang="pt-BR" sz="3200" dirty="0" smtClean="0">
+                <a:solidFill>
+                  <a:schemeClr val="bg1"/>
+                </a:solidFill>
+              </a:rPr>
+              <a:t>curto-circuito</a:t>
+            </a:r>
+            <a:r>
+              <a:rPr lang="pt-BR" sz="3200" dirty="0">
+                <a:solidFill>
+                  <a:schemeClr val="bg1"/>
+                </a:solidFill>
+              </a:rPr>
+              <a:t> ou a junção indutiva entre essas duas linhas independentes.</a:t>
+            </a:r>
+          </a:p>
+          <a:p>
             <a:endParaRPr lang="pt-BR" dirty="0"/>
           </a:p>
         </p:txBody>
@@ -4058,6 +4163,294 @@
 </file>
 
 <file path=ppt/slides/slide7.xml><?xml version="1.0" encoding="utf-8"?>
+<p:sld xmlns:a="http://schemas.openxmlformats.org/drawingml/2006/main" xmlns:r="http://schemas.openxmlformats.org/officeDocument/2006/relationships" xmlns:p="http://schemas.openxmlformats.org/presentationml/2006/main">
+  <p:cSld>
+    <p:spTree>
+      <p:nvGrpSpPr>
+        <p:cNvPr id="1" name=""/>
+        <p:cNvGrpSpPr/>
+        <p:nvPr/>
+      </p:nvGrpSpPr>
+      <p:grpSpPr>
+        <a:xfrm>
+          <a:off x="0" y="0"/>
+          <a:ext cx="0" cy="0"/>
+          <a:chOff x="0" y="0"/>
+          <a:chExt cx="0" cy="0"/>
+        </a:xfrm>
+      </p:grpSpPr>
+      <p:sp>
+        <p:nvSpPr>
+          <p:cNvPr id="2" name="Título 1"/>
+          <p:cNvSpPr>
+            <a:spLocks noGrp="1"/>
+          </p:cNvSpPr>
+          <p:nvPr>
+            <p:ph type="title"/>
+          </p:nvPr>
+        </p:nvSpPr>
+        <p:spPr/>
+        <p:txBody>
+          <a:bodyPr/>
+          <a:lstStyle/>
+          <a:p>
+            <a:pPr algn="ctr"/>
+            <a:r>
+              <a:rPr kumimoji="0" lang="pt-BR" altLang="pt-BR" b="1" i="1" u="none" strike="noStrike" cap="none" normalizeH="0" baseline="0" dirty="0" smtClean="0">
+                <a:ln>
+                  <a:noFill/>
+                </a:ln>
+                <a:solidFill>
+                  <a:srgbClr val="79610D"/>
+                </a:solidFill>
+                <a:effectLst/>
+                <a:latin typeface="Arial" panose="020B0604020202020204" pitchFamily="34" charset="0"/>
+                <a:ea typeface="Times New Roman" panose="02020603050405020304" pitchFamily="18" charset="0"/>
+                <a:cs typeface="Comic Sans MS" panose="030F0702030302020204" pitchFamily="66" charset="0"/>
+              </a:rPr>
+              <a:t>Ruído </a:t>
+            </a:r>
+            <a:r>
+              <a:rPr kumimoji="0" lang="pt-BR" altLang="pt-BR" b="1" i="1" u="none" strike="noStrike" cap="none" normalizeH="0" baseline="0" dirty="0" err="1" smtClean="0">
+                <a:ln>
+                  <a:noFill/>
+                </a:ln>
+                <a:solidFill>
+                  <a:srgbClr val="79610D"/>
+                </a:solidFill>
+                <a:effectLst/>
+                <a:latin typeface="Arial" panose="020B0604020202020204" pitchFamily="34" charset="0"/>
+                <a:ea typeface="Times New Roman" panose="02020603050405020304" pitchFamily="18" charset="0"/>
+                <a:cs typeface="Comic Sans MS" panose="030F0702030302020204" pitchFamily="66" charset="0"/>
+              </a:rPr>
+              <a:t>Crosstalk</a:t>
+            </a:r>
+            <a:endParaRPr lang="pt-BR" dirty="0"/>
+          </a:p>
+        </p:txBody>
+      </p:sp>
+      <p:sp>
+        <p:nvSpPr>
+          <p:cNvPr id="3" name="Espaço Reservado para Conteúdo 2"/>
+          <p:cNvSpPr>
+            <a:spLocks noGrp="1"/>
+          </p:cNvSpPr>
+          <p:nvPr>
+            <p:ph idx="1"/>
+          </p:nvPr>
+        </p:nvSpPr>
+        <p:spPr/>
+        <p:txBody>
+          <a:bodyPr/>
+          <a:lstStyle/>
+          <a:p>
+            <a:r>
+              <a:rPr lang="pt-BR" sz="3600" dirty="0">
+                <a:solidFill>
+                  <a:schemeClr val="bg1"/>
+                </a:solidFill>
+              </a:rPr>
+              <a:t>Em </a:t>
+            </a:r>
+            <a:r>
+              <a:rPr lang="pt-BR" sz="3600" dirty="0" smtClean="0">
+                <a:solidFill>
+                  <a:schemeClr val="bg1"/>
+                </a:solidFill>
+              </a:rPr>
+              <a:t>eletrônica,</a:t>
+            </a:r>
+            <a:r>
+              <a:rPr lang="pt-BR" sz="3600" dirty="0">
+                <a:solidFill>
+                  <a:schemeClr val="bg1"/>
+                </a:solidFill>
+              </a:rPr>
+              <a:t> </a:t>
+            </a:r>
+            <a:r>
+              <a:rPr lang="pt-BR" sz="3600" i="1" dirty="0" err="1">
+                <a:solidFill>
+                  <a:schemeClr val="bg1"/>
+                </a:solidFill>
+              </a:rPr>
+              <a:t>crosstalk</a:t>
+            </a:r>
+            <a:r>
+              <a:rPr lang="pt-BR" sz="3600" dirty="0">
+                <a:solidFill>
+                  <a:schemeClr val="bg1"/>
+                </a:solidFill>
+              </a:rPr>
+              <a:t> é qualquer fenômeno em que um sinal transmitido em um circuito ou canal de um sistema de transmissão cria um efeito indesejado em outro circuito ou canal. </a:t>
+            </a:r>
+            <a:r>
+              <a:rPr lang="pt-BR" sz="3600" i="1" dirty="0" err="1">
+                <a:solidFill>
+                  <a:schemeClr val="bg1"/>
+                </a:solidFill>
+              </a:rPr>
+              <a:t>Crosstalk</a:t>
+            </a:r>
+            <a:r>
+              <a:rPr lang="pt-BR" sz="3600" dirty="0">
+                <a:solidFill>
+                  <a:schemeClr val="bg1"/>
+                </a:solidFill>
+              </a:rPr>
+              <a:t> é normalmente causado por capacitâncias, indutâncias ou conexão condutiva com um circuito ou canal — todas indesejadas.</a:t>
+            </a:r>
+          </a:p>
+          <a:p>
+            <a:endParaRPr lang="pt-BR" dirty="0"/>
+          </a:p>
+        </p:txBody>
+      </p:sp>
+    </p:spTree>
+    <p:extLst>
+      <p:ext uri="{BB962C8B-B14F-4D97-AF65-F5344CB8AC3E}">
+        <p14:creationId xmlns:p14="http://schemas.microsoft.com/office/powerpoint/2010/main" val="1745089375"/>
+      </p:ext>
+    </p:extLst>
+  </p:cSld>
+  <p:clrMapOvr>
+    <a:masterClrMapping/>
+  </p:clrMapOvr>
+  <p:timing>
+    <p:tnLst>
+      <p:par>
+        <p:cTn id="1" dur="indefinite" restart="never" nodeType="tmRoot"/>
+      </p:par>
+    </p:tnLst>
+  </p:timing>
+</p:sld>
+</file>
+
+<file path=ppt/slides/slide8.xml><?xml version="1.0" encoding="utf-8"?>
+<p:sld xmlns:a="http://schemas.openxmlformats.org/drawingml/2006/main" xmlns:r="http://schemas.openxmlformats.org/officeDocument/2006/relationships" xmlns:p="http://schemas.openxmlformats.org/presentationml/2006/main">
+  <p:cSld>
+    <p:spTree>
+      <p:nvGrpSpPr>
+        <p:cNvPr id="1" name=""/>
+        <p:cNvGrpSpPr/>
+        <p:nvPr/>
+      </p:nvGrpSpPr>
+      <p:grpSpPr>
+        <a:xfrm>
+          <a:off x="0" y="0"/>
+          <a:ext cx="0" cy="0"/>
+          <a:chOff x="0" y="0"/>
+          <a:chExt cx="0" cy="0"/>
+        </a:xfrm>
+      </p:grpSpPr>
+      <p:sp>
+        <p:nvSpPr>
+          <p:cNvPr id="2" name="Título 1"/>
+          <p:cNvSpPr>
+            <a:spLocks noGrp="1"/>
+          </p:cNvSpPr>
+          <p:nvPr>
+            <p:ph type="title"/>
+          </p:nvPr>
+        </p:nvSpPr>
+        <p:spPr/>
+        <p:txBody>
+          <a:bodyPr/>
+          <a:lstStyle/>
+          <a:p>
+            <a:pPr algn="ctr"/>
+            <a:r>
+              <a:rPr kumimoji="0" lang="pt-BR" altLang="pt-BR" b="1" i="1" u="none" strike="noStrike" cap="none" normalizeH="0" baseline="0" dirty="0" smtClean="0">
+                <a:ln>
+                  <a:noFill/>
+                </a:ln>
+                <a:solidFill>
+                  <a:srgbClr val="79610D"/>
+                </a:solidFill>
+                <a:effectLst/>
+                <a:latin typeface="Arial" panose="020B0604020202020204" pitchFamily="34" charset="0"/>
+                <a:ea typeface="Times New Roman" panose="02020603050405020304" pitchFamily="18" charset="0"/>
+                <a:cs typeface="Comic Sans MS" panose="030F0702030302020204" pitchFamily="66" charset="0"/>
+              </a:rPr>
+              <a:t>Ruído </a:t>
+            </a:r>
+            <a:r>
+              <a:rPr kumimoji="0" lang="pt-BR" altLang="pt-BR" b="1" i="1" u="none" strike="noStrike" cap="none" normalizeH="0" baseline="0" dirty="0" err="1" smtClean="0">
+                <a:ln>
+                  <a:noFill/>
+                </a:ln>
+                <a:solidFill>
+                  <a:srgbClr val="79610D"/>
+                </a:solidFill>
+                <a:effectLst/>
+                <a:latin typeface="Arial" panose="020B0604020202020204" pitchFamily="34" charset="0"/>
+                <a:ea typeface="Times New Roman" panose="02020603050405020304" pitchFamily="18" charset="0"/>
+                <a:cs typeface="Comic Sans MS" panose="030F0702030302020204" pitchFamily="66" charset="0"/>
+              </a:rPr>
+              <a:t>Crosstalk</a:t>
+            </a:r>
+            <a:endParaRPr lang="pt-BR" dirty="0"/>
+          </a:p>
+        </p:txBody>
+      </p:sp>
+      <p:pic>
+        <p:nvPicPr>
+          <p:cNvPr id="4" name="Espaço Reservado para Conteúdo 3" descr="https://media.licdn.com/dms/image/C4E12AQHmj2xR6anxEQ/article-inline_image-shrink_1000_1488/0?e=2123290800&amp;v=beta&amp;t=dN55d5cgWj0Kd37HoNyxxcCXdXVeKACj8kQqhr1GhY8"/>
+          <p:cNvPicPr>
+            <a:picLocks noGrp="1"/>
+          </p:cNvPicPr>
+          <p:nvPr>
+            <p:ph idx="1"/>
+          </p:nvPr>
+        </p:nvPicPr>
+        <p:blipFill>
+          <a:blip r:embed="rId2">
+            <a:extLst>
+              <a:ext uri="{28A0092B-C50C-407E-A947-70E740481C1C}">
+                <a14:useLocalDpi xmlns:a14="http://schemas.microsoft.com/office/drawing/2010/main" val="0"/>
+              </a:ext>
+            </a:extLst>
+          </a:blip>
+          <a:srcRect/>
+          <a:stretch>
+            <a:fillRect/>
+          </a:stretch>
+        </p:blipFill>
+        <p:spPr bwMode="auto">
+          <a:xfrm>
+            <a:off x="1109061" y="1690688"/>
+            <a:ext cx="9854685" cy="4791593"/>
+          </a:xfrm>
+          <a:prstGeom prst="rect">
+            <a:avLst/>
+          </a:prstGeom>
+          <a:noFill/>
+          <a:ln>
+            <a:noFill/>
+          </a:ln>
+        </p:spPr>
+      </p:pic>
+    </p:spTree>
+    <p:extLst>
+      <p:ext uri="{BB962C8B-B14F-4D97-AF65-F5344CB8AC3E}">
+        <p14:creationId xmlns:p14="http://schemas.microsoft.com/office/powerpoint/2010/main" val="2649363876"/>
+      </p:ext>
+    </p:extLst>
+  </p:cSld>
+  <p:clrMapOvr>
+    <a:masterClrMapping/>
+  </p:clrMapOvr>
+  <p:timing>
+    <p:tnLst>
+      <p:par>
+        <p:cTn id="1" dur="indefinite" restart="never" nodeType="tmRoot"/>
+      </p:par>
+    </p:tnLst>
+  </p:timing>
+</p:sld>
+</file>
+
+<file path=ppt/slides/slide9.xml><?xml version="1.0" encoding="utf-8"?>
 <p:sld xmlns:a="http://schemas.openxmlformats.org/drawingml/2006/main" xmlns:r="http://schemas.openxmlformats.org/officeDocument/2006/relationships" xmlns:p="http://schemas.openxmlformats.org/presentationml/2006/main">
   <p:cSld>
     <p:spTree>

</xml_diff>